<commit_message>
update slide little improvements
</commit_message>
<xml_diff>
--- a/spark-tutorial/DDM SPARK HOMEWORK TRANSFORMATION PIPELINE.pptx
+++ b/spark-tutorial/DDM SPARK HOMEWORK TRANSFORMATION PIPELINE.pptx
@@ -105,7 +105,20 @@
       </a:defRPr>
     </a:lvl9pPr>
   </p:defaultTextStyle>
+  <p:extLst>
+    <p:ext uri="{EFAFB233-063F-42B5-8137-9DF3F51BA10A}">
+      <p15:sldGuideLst xmlns:p15="http://schemas.microsoft.com/office/powerpoint/2012/main"/>
+    </p:ext>
+  </p:extLst>
 </p:presentation>
+</file>
+
+<file path=ppt/revisionInfo.xml><?xml version="1.0" encoding="utf-8"?>
+<p1510:revInfo xmlns:a="http://schemas.openxmlformats.org/drawingml/2006/main" xmlns:r="http://schemas.openxmlformats.org/officeDocument/2006/relationships" xmlns:p1510="http://schemas.microsoft.com/office/powerpoint/2015/10/main">
+  <p1510:revLst>
+    <p1510:client id="{182088BC-60C9-4ABB-A360-A20DFD81C359}" v="3" dt="2020-01-22T12:14:25.122"/>
+  </p1510:revLst>
+</p1510:revInfo>
 </file>
 
 <file path=ppt/slideLayouts/slideLayout1.xml><?xml version="1.0" encoding="utf-8"?>
@@ -4083,8 +4096,8 @@
         </p:nvSpPr>
         <p:spPr>
           <a:xfrm>
-            <a:off x="9359318" y="3454489"/>
-            <a:ext cx="1837189" cy="872455"/>
+            <a:off x="9082477" y="3454489"/>
+            <a:ext cx="2427218" cy="872455"/>
           </a:xfrm>
           <a:prstGeom prst="roundRect">
             <a:avLst/>
@@ -4167,6 +4180,50 @@
               </a:rPr>
               <a:t>tuples</a:t>
             </a:r>
+            <a:r>
+              <a:rPr lang="de-DE" dirty="0">
+                <a:solidFill>
+                  <a:schemeClr val="tx1">
+                    <a:lumMod val="95000"/>
+                    <a:lumOff val="5000"/>
+                  </a:schemeClr>
+                </a:solidFill>
+              </a:rPr>
+              <a:t> and </a:t>
+            </a:r>
+            <a:r>
+              <a:rPr lang="de-DE" dirty="0" err="1">
+                <a:solidFill>
+                  <a:schemeClr val="tx1">
+                    <a:lumMod val="95000"/>
+                    <a:lumOff val="5000"/>
+                  </a:schemeClr>
+                </a:solidFill>
+              </a:rPr>
+              <a:t>remove</a:t>
+            </a:r>
+            <a:r>
+              <a:rPr lang="de-DE" dirty="0">
+                <a:solidFill>
+                  <a:schemeClr val="tx1">
+                    <a:lumMod val="95000"/>
+                    <a:lumOff val="5000"/>
+                  </a:schemeClr>
+                </a:solidFill>
+              </a:rPr>
+              <a:t> </a:t>
+            </a:r>
+            <a:r>
+              <a:rPr lang="de-DE" dirty="0" err="1">
+                <a:solidFill>
+                  <a:schemeClr val="tx1">
+                    <a:lumMod val="95000"/>
+                    <a:lumOff val="5000"/>
+                  </a:schemeClr>
+                </a:solidFill>
+              </a:rPr>
+              <a:t>duplicates</a:t>
+            </a:r>
             <a:endParaRPr lang="de-DE" dirty="0">
               <a:solidFill>
                 <a:schemeClr val="tx1">
@@ -4188,15 +4245,16 @@
             </a:extLst>
           </p:cNvPr>
           <p:cNvCxnSpPr>
+            <a:cxnSpLocks/>
             <a:stCxn id="12" idx="2"/>
             <a:endCxn id="47" idx="0"/>
           </p:cNvCxnSpPr>
           <p:nvPr/>
         </p:nvCxnSpPr>
         <p:spPr>
-          <a:xfrm flipH="1">
-            <a:off x="10277913" y="2559254"/>
-            <a:ext cx="4" cy="895235"/>
+          <a:xfrm>
+            <a:off x="10277917" y="2559254"/>
+            <a:ext cx="18169" cy="895235"/>
           </a:xfrm>
           <a:prstGeom prst="straightConnector1">
             <a:avLst/>
@@ -4220,151 +4278,6 @@
           </a:fontRef>
         </p:style>
       </p:cxnSp>
-      <p:sp>
-        <p:nvSpPr>
-          <p:cNvPr id="54" name="Rechteck: abgerundete Ecken 53">
-            <a:extLst>
-              <a:ext uri="{FF2B5EF4-FFF2-40B4-BE49-F238E27FC236}">
-                <a16:creationId xmlns:a16="http://schemas.microsoft.com/office/drawing/2014/main" id="{AD81D28C-D3E9-485E-8E35-1BCD236A44D8}"/>
-              </a:ext>
-            </a:extLst>
-          </p:cNvPr>
-          <p:cNvSpPr/>
-          <p:nvPr/>
-        </p:nvSpPr>
-        <p:spPr>
-          <a:xfrm>
-            <a:off x="6518945" y="3454489"/>
-            <a:ext cx="1837189" cy="872455"/>
-          </a:xfrm>
-          <a:prstGeom prst="roundRect">
-            <a:avLst/>
-          </a:prstGeom>
-          <a:noFill/>
-        </p:spPr>
-        <p:style>
-          <a:lnRef idx="2">
-            <a:schemeClr val="accent1">
-              <a:shade val="50000"/>
-            </a:schemeClr>
-          </a:lnRef>
-          <a:fillRef idx="1">
-            <a:schemeClr val="accent1"/>
-          </a:fillRef>
-          <a:effectRef idx="0">
-            <a:schemeClr val="accent1"/>
-          </a:effectRef>
-          <a:fontRef idx="minor">
-            <a:schemeClr val="lt1"/>
-          </a:fontRef>
-        </p:style>
-        <p:txBody>
-          <a:bodyPr rtlCol="0" anchor="ctr"/>
-          <a:lstStyle/>
-          <a:p>
-            <a:pPr algn="ctr"/>
-            <a:r>
-              <a:rPr lang="de-DE" dirty="0">
-                <a:solidFill>
-                  <a:schemeClr val="tx1">
-                    <a:lumMod val="95000"/>
-                    <a:lumOff val="5000"/>
-                  </a:schemeClr>
-                </a:solidFill>
-              </a:rPr>
-              <a:t>Group </a:t>
-            </a:r>
-            <a:r>
-              <a:rPr lang="de-DE" dirty="0" err="1">
-                <a:solidFill>
-                  <a:schemeClr val="tx1">
-                    <a:lumMod val="95000"/>
-                    <a:lumOff val="5000"/>
-                  </a:schemeClr>
-                </a:solidFill>
-              </a:rPr>
-              <a:t>by</a:t>
-            </a:r>
-            <a:r>
-              <a:rPr lang="de-DE" dirty="0">
-                <a:solidFill>
-                  <a:schemeClr val="tx1">
-                    <a:lumMod val="95000"/>
-                    <a:lumOff val="5000"/>
-                  </a:schemeClr>
-                </a:solidFill>
-              </a:rPr>
-              <a:t> </a:t>
-            </a:r>
-            <a:r>
-              <a:rPr lang="de-DE" dirty="0" err="1">
-                <a:solidFill>
-                  <a:schemeClr val="tx1">
-                    <a:lumMod val="95000"/>
-                    <a:lumOff val="5000"/>
-                  </a:schemeClr>
-                </a:solidFill>
-              </a:rPr>
-              <a:t>value</a:t>
-            </a:r>
-            <a:r>
-              <a:rPr lang="de-DE" dirty="0">
-                <a:solidFill>
-                  <a:schemeClr val="tx1">
-                    <a:lumMod val="95000"/>
-                    <a:lumOff val="5000"/>
-                  </a:schemeClr>
-                </a:solidFill>
-              </a:rPr>
-              <a:t> and </a:t>
-            </a:r>
-            <a:r>
-              <a:rPr lang="de-DE" dirty="0" err="1">
-                <a:solidFill>
-                  <a:schemeClr val="tx1">
-                    <a:lumMod val="95000"/>
-                    <a:lumOff val="5000"/>
-                  </a:schemeClr>
-                </a:solidFill>
-              </a:rPr>
-              <a:t>aggregate</a:t>
-            </a:r>
-            <a:r>
-              <a:rPr lang="de-DE" dirty="0">
-                <a:solidFill>
-                  <a:schemeClr val="tx1">
-                    <a:lumMod val="95000"/>
-                    <a:lumOff val="5000"/>
-                  </a:schemeClr>
-                </a:solidFill>
-              </a:rPr>
-              <a:t>( </a:t>
-            </a:r>
-            <a:r>
-              <a:rPr lang="de-DE" dirty="0" err="1">
-                <a:solidFill>
-                  <a:schemeClr val="tx1">
-                    <a:lumMod val="95000"/>
-                    <a:lumOff val="5000"/>
-                  </a:schemeClr>
-                </a:solidFill>
-              </a:rPr>
-              <a:t>collect_set</a:t>
-            </a:r>
-            <a:r>
-              <a:rPr lang="de-DE" dirty="0">
-                <a:solidFill>
-                  <a:schemeClr val="tx1">
-                    <a:lumMod val="95000"/>
-                    <a:lumOff val="5000"/>
-                  </a:schemeClr>
-                </a:solidFill>
-              </a:rPr>
-              <a:t>())</a:t>
-            </a:r>
-          </a:p>
-        </p:txBody>
-      </p:sp>
       <p:cxnSp>
         <p:nvCxnSpPr>
           <p:cNvPr id="56" name="Gerade Verbindung mit Pfeil 55">
@@ -4375,15 +4288,15 @@
             </a:extLst>
           </p:cNvPr>
           <p:cNvCxnSpPr>
+            <a:cxnSpLocks/>
             <a:stCxn id="47" idx="1"/>
-            <a:endCxn id="54" idx="3"/>
           </p:cNvCxnSpPr>
           <p:nvPr/>
         </p:nvCxnSpPr>
         <p:spPr>
           <a:xfrm flipH="1">
-            <a:off x="8356134" y="3890717"/>
-            <a:ext cx="1003184" cy="0"/>
+            <a:off x="8319773" y="3890717"/>
+            <a:ext cx="762704" cy="0"/>
           </a:xfrm>
           <a:prstGeom prst="straightConnector1">
             <a:avLst/>
@@ -4468,7 +4381,7 @@
         </p:nvSpPr>
         <p:spPr>
           <a:xfrm>
-            <a:off x="3389852" y="1317467"/>
+            <a:off x="3599578" y="1334502"/>
             <a:ext cx="8111452" cy="369332"/>
           </a:xfrm>
           <a:prstGeom prst="rect">
@@ -4482,11 +4395,27 @@
           </a:bodyPr>
           <a:lstStyle/>
           <a:p>
-            <a:pPr algn="ctr"/>
+            <a:r>
+              <a:rPr lang="de-DE" b="1" dirty="0" err="1"/>
+              <a:t>map</a:t>
+            </a:r>
             <a:r>
               <a:rPr lang="de-DE" b="1" dirty="0"/>
-              <a:t>FOREACH FILE</a:t>
-            </a:r>
+              <a:t> </a:t>
+            </a:r>
+            <a:r>
+              <a:rPr lang="de-DE" b="1" dirty="0" err="1"/>
+              <a:t>filenames</a:t>
+            </a:r>
+            <a:r>
+              <a:rPr lang="de-DE" b="1" dirty="0"/>
+              <a:t> </a:t>
+            </a:r>
+            <a:r>
+              <a:rPr lang="de-DE" b="1" dirty="0" err="1"/>
+              <a:t>to</a:t>
+            </a:r>
+            <a:endParaRPr lang="de-DE" b="1" dirty="0"/>
           </a:p>
         </p:txBody>
       </p:sp>
@@ -4504,7 +4433,7 @@
         </p:nvSpPr>
         <p:spPr>
           <a:xfrm>
-            <a:off x="3678572" y="3452478"/>
+            <a:off x="6526983" y="3451180"/>
             <a:ext cx="1837189" cy="872455"/>
           </a:xfrm>
           <a:prstGeom prst="roundRect">
@@ -4646,25 +4575,234 @@
           </a:p>
         </p:txBody>
       </p:sp>
+      <p:sp>
+        <p:nvSpPr>
+          <p:cNvPr id="65" name="Rechteck: abgerundete Ecken 64">
+            <a:extLst>
+              <a:ext uri="{FF2B5EF4-FFF2-40B4-BE49-F238E27FC236}">
+                <a16:creationId xmlns:a16="http://schemas.microsoft.com/office/drawing/2014/main" id="{12192BF8-EA81-4024-B8B2-273E3DE83DB3}"/>
+              </a:ext>
+            </a:extLst>
+          </p:cNvPr>
+          <p:cNvSpPr/>
+          <p:nvPr/>
+        </p:nvSpPr>
+        <p:spPr>
+          <a:xfrm>
+            <a:off x="3489828" y="3452478"/>
+            <a:ext cx="2175188" cy="872455"/>
+          </a:xfrm>
+          <a:prstGeom prst="roundRect">
+            <a:avLst/>
+          </a:prstGeom>
+          <a:noFill/>
+        </p:spPr>
+        <p:style>
+          <a:lnRef idx="2">
+            <a:schemeClr val="accent1">
+              <a:shade val="50000"/>
+            </a:schemeClr>
+          </a:lnRef>
+          <a:fillRef idx="1">
+            <a:schemeClr val="accent1"/>
+          </a:fillRef>
+          <a:effectRef idx="0">
+            <a:schemeClr val="accent1"/>
+          </a:effectRef>
+          <a:fontRef idx="minor">
+            <a:schemeClr val="lt1"/>
+          </a:fontRef>
+        </p:style>
+        <p:txBody>
+          <a:bodyPr rtlCol="0" anchor="ctr"/>
+          <a:lstStyle/>
+          <a:p>
+            <a:pPr algn="ctr"/>
+            <a:r>
+              <a:rPr lang="de-DE" dirty="0">
+                <a:solidFill>
+                  <a:schemeClr val="tx1">
+                    <a:lumMod val="95000"/>
+                    <a:lumOff val="5000"/>
+                  </a:schemeClr>
+                </a:solidFill>
+              </a:rPr>
+              <a:t> </a:t>
+            </a:r>
+            <a:r>
+              <a:rPr lang="de-DE" dirty="0" err="1">
+                <a:solidFill>
+                  <a:schemeClr val="tx1">
+                    <a:lumMod val="95000"/>
+                    <a:lumOff val="5000"/>
+                  </a:schemeClr>
+                </a:solidFill>
+              </a:rPr>
+              <a:t>remove</a:t>
+            </a:r>
+            <a:r>
+              <a:rPr lang="de-DE" dirty="0">
+                <a:solidFill>
+                  <a:schemeClr val="tx1">
+                    <a:lumMod val="95000"/>
+                    <a:lumOff val="5000"/>
+                  </a:schemeClr>
+                </a:solidFill>
+              </a:rPr>
+              <a:t> </a:t>
+            </a:r>
+            <a:r>
+              <a:rPr lang="de-DE" dirty="0" err="1">
+                <a:solidFill>
+                  <a:schemeClr val="tx1">
+                    <a:lumMod val="95000"/>
+                    <a:lumOff val="5000"/>
+                  </a:schemeClr>
+                </a:solidFill>
+              </a:rPr>
+              <a:t>duplicates</a:t>
+            </a:r>
+            <a:r>
+              <a:rPr lang="de-DE" dirty="0">
+                <a:solidFill>
+                  <a:schemeClr val="tx1">
+                    <a:lumMod val="95000"/>
+                    <a:lumOff val="5000"/>
+                  </a:schemeClr>
+                </a:solidFill>
+              </a:rPr>
+              <a:t> and </a:t>
+            </a:r>
+            <a:r>
+              <a:rPr lang="de-DE" dirty="0" err="1">
+                <a:solidFill>
+                  <a:schemeClr val="tx1">
+                    <a:lumMod val="95000"/>
+                    <a:lumOff val="5000"/>
+                  </a:schemeClr>
+                </a:solidFill>
+              </a:rPr>
+              <a:t>add</a:t>
+            </a:r>
+            <a:r>
+              <a:rPr lang="de-DE" dirty="0">
+                <a:solidFill>
+                  <a:schemeClr val="tx1">
+                    <a:lumMod val="95000"/>
+                    <a:lumOff val="5000"/>
+                  </a:schemeClr>
+                </a:solidFill>
+              </a:rPr>
+              <a:t> </a:t>
+            </a:r>
+            <a:r>
+              <a:rPr lang="de-DE" dirty="0" err="1">
+                <a:solidFill>
+                  <a:schemeClr val="tx1">
+                    <a:lumMod val="95000"/>
+                    <a:lumOff val="5000"/>
+                  </a:schemeClr>
+                </a:solidFill>
+              </a:rPr>
+              <a:t>column</a:t>
+            </a:r>
+            <a:r>
+              <a:rPr lang="de-DE" dirty="0">
+                <a:solidFill>
+                  <a:schemeClr val="tx1">
+                    <a:lumMod val="95000"/>
+                    <a:lumOff val="5000"/>
+                  </a:schemeClr>
+                </a:solidFill>
+              </a:rPr>
+              <a:t> </a:t>
+            </a:r>
+            <a:r>
+              <a:rPr lang="de-DE" dirty="0" err="1">
+                <a:solidFill>
+                  <a:schemeClr val="tx1">
+                    <a:lumMod val="95000"/>
+                    <a:lumOff val="5000"/>
+                  </a:schemeClr>
+                </a:solidFill>
+              </a:rPr>
+              <a:t>with</a:t>
+            </a:r>
+            <a:r>
+              <a:rPr lang="de-DE" dirty="0">
+                <a:solidFill>
+                  <a:schemeClr val="tx1">
+                    <a:lumMod val="95000"/>
+                    <a:lumOff val="5000"/>
+                  </a:schemeClr>
+                </a:solidFill>
+              </a:rPr>
+              <a:t> </a:t>
+            </a:r>
+            <a:r>
+              <a:rPr lang="de-DE" dirty="0" err="1">
+                <a:solidFill>
+                  <a:schemeClr val="tx1">
+                    <a:lumMod val="95000"/>
+                    <a:lumOff val="5000"/>
+                  </a:schemeClr>
+                </a:solidFill>
+              </a:rPr>
+              <a:t>column</a:t>
+            </a:r>
+            <a:r>
+              <a:rPr lang="de-DE" dirty="0">
+                <a:solidFill>
+                  <a:schemeClr val="tx1">
+                    <a:lumMod val="95000"/>
+                    <a:lumOff val="5000"/>
+                  </a:schemeClr>
+                </a:solidFill>
+              </a:rPr>
+              <a:t> </a:t>
+            </a:r>
+            <a:r>
+              <a:rPr lang="de-DE" dirty="0" err="1">
+                <a:solidFill>
+                  <a:schemeClr val="tx1">
+                    <a:lumMod val="95000"/>
+                    <a:lumOff val="5000"/>
+                  </a:schemeClr>
+                </a:solidFill>
+              </a:rPr>
+              <a:t>names</a:t>
+            </a:r>
+            <a:endParaRPr lang="de-DE" dirty="0">
+              <a:solidFill>
+                <a:schemeClr val="tx1">
+                  <a:lumMod val="95000"/>
+                  <a:lumOff val="5000"/>
+                </a:schemeClr>
+              </a:solidFill>
+            </a:endParaRPr>
+          </a:p>
+        </p:txBody>
+      </p:sp>
       <p:cxnSp>
         <p:nvCxnSpPr>
-          <p:cNvPr id="64" name="Gerade Verbindung mit Pfeil 63">
-            <a:extLst>
-              <a:ext uri="{FF2B5EF4-FFF2-40B4-BE49-F238E27FC236}">
-                <a16:creationId xmlns:a16="http://schemas.microsoft.com/office/drawing/2014/main" id="{D19A5CC3-074E-4599-9368-DF72671D5408}"/>
+          <p:cNvPr id="67" name="Gerade Verbindung mit Pfeil 66">
+            <a:extLst>
+              <a:ext uri="{FF2B5EF4-FFF2-40B4-BE49-F238E27FC236}">
+                <a16:creationId xmlns:a16="http://schemas.microsoft.com/office/drawing/2014/main" id="{C428D70B-76CE-4D02-A2DD-5C5F1C280D75}"/>
               </a:ext>
             </a:extLst>
           </p:cNvPr>
           <p:cNvCxnSpPr>
-            <a:stCxn id="54" idx="1"/>
-            <a:endCxn id="62" idx="3"/>
+            <a:cxnSpLocks/>
+            <a:stCxn id="62" idx="1"/>
+            <a:endCxn id="65" idx="3"/>
           </p:cNvCxnSpPr>
           <p:nvPr/>
         </p:nvCxnSpPr>
         <p:spPr>
-          <a:xfrm flipH="1" flipV="1">
-            <a:off x="5515761" y="3888706"/>
-            <a:ext cx="1003184" cy="2011"/>
+          <a:xfrm flipH="1">
+            <a:off x="5665016" y="3887408"/>
+            <a:ext cx="861967" cy="1298"/>
           </a:xfrm>
           <a:prstGeom prst="straightConnector1">
             <a:avLst/>
@@ -4690,10 +4828,10 @@
       </p:cxnSp>
       <p:sp>
         <p:nvSpPr>
-          <p:cNvPr id="65" name="Rechteck: abgerundete Ecken 64">
-            <a:extLst>
-              <a:ext uri="{FF2B5EF4-FFF2-40B4-BE49-F238E27FC236}">
-                <a16:creationId xmlns:a16="http://schemas.microsoft.com/office/drawing/2014/main" id="{12192BF8-EA81-4024-B8B2-273E3DE83DB3}"/>
+          <p:cNvPr id="77" name="Rechteck: abgerundete Ecken 76">
+            <a:extLst>
+              <a:ext uri="{FF2B5EF4-FFF2-40B4-BE49-F238E27FC236}">
+                <a16:creationId xmlns:a16="http://schemas.microsoft.com/office/drawing/2014/main" id="{BF2AA316-5185-4045-BCA3-B94F50D96534}"/>
               </a:ext>
             </a:extLst>
           </p:cNvPr>
@@ -4702,7 +4840,7 @@
         </p:nvSpPr>
         <p:spPr>
           <a:xfrm>
-            <a:off x="838199" y="3452478"/>
+            <a:off x="838196" y="3451180"/>
             <a:ext cx="1837189" cy="872455"/>
           </a:xfrm>
           <a:prstGeom prst="roundRect">
@@ -4740,7 +4878,7 @@
                   </a:schemeClr>
                 </a:solidFill>
               </a:rPr>
-              <a:t>add</a:t>
+              <a:t>remove</a:t>
             </a:r>
             <a:r>
               <a:rPr lang="de-DE" dirty="0">
@@ -4751,6 +4889,28 @@
                   </a:schemeClr>
                 </a:solidFill>
               </a:rPr>
+              <a:t> own </a:t>
+            </a:r>
+            <a:r>
+              <a:rPr lang="de-DE" dirty="0" err="1">
+                <a:solidFill>
+                  <a:schemeClr val="tx1">
+                    <a:lumMod val="95000"/>
+                    <a:lumOff val="5000"/>
+                  </a:schemeClr>
+                </a:solidFill>
+              </a:rPr>
+              <a:t>column</a:t>
+            </a:r>
+            <a:r>
+              <a:rPr lang="de-DE" dirty="0">
+                <a:solidFill>
+                  <a:schemeClr val="tx1">
+                    <a:lumMod val="95000"/>
+                    <a:lumOff val="5000"/>
+                  </a:schemeClr>
+                </a:solidFill>
+              </a:rPr>
               <a:t> </a:t>
             </a:r>
             <a:r>
@@ -4762,7 +4922,7 @@
                   </a:schemeClr>
                 </a:solidFill>
               </a:rPr>
-              <a:t>column</a:t>
+              <a:t>from</a:t>
             </a:r>
             <a:r>
               <a:rPr lang="de-DE" dirty="0">
@@ -4784,7 +4944,7 @@
                   </a:schemeClr>
                 </a:solidFill>
               </a:rPr>
-              <a:t>with</a:t>
+              <a:t>inclusion</a:t>
             </a:r>
             <a:r>
               <a:rPr lang="de-DE" dirty="0">
@@ -4806,29 +4966,7 @@
                   </a:schemeClr>
                 </a:solidFill>
               </a:rPr>
-              <a:t>column</a:t>
-            </a:r>
-            <a:r>
-              <a:rPr lang="de-DE" dirty="0">
-                <a:solidFill>
-                  <a:schemeClr val="tx1">
-                    <a:lumMod val="95000"/>
-                    <a:lumOff val="5000"/>
-                  </a:schemeClr>
-                </a:solidFill>
-              </a:rPr>
-              <a:t> </a:t>
-            </a:r>
-            <a:r>
-              <a:rPr lang="de-DE" dirty="0" err="1">
-                <a:solidFill>
-                  <a:schemeClr val="tx1">
-                    <a:lumMod val="95000"/>
-                    <a:lumOff val="5000"/>
-                  </a:schemeClr>
-                </a:solidFill>
-              </a:rPr>
-              <a:t>names</a:t>
+              <a:t>set</a:t>
             </a:r>
             <a:endParaRPr lang="de-DE" dirty="0">
               <a:solidFill>
@@ -4843,23 +4981,24 @@
       </p:sp>
       <p:cxnSp>
         <p:nvCxnSpPr>
-          <p:cNvPr id="67" name="Gerade Verbindung mit Pfeil 66">
-            <a:extLst>
-              <a:ext uri="{FF2B5EF4-FFF2-40B4-BE49-F238E27FC236}">
-                <a16:creationId xmlns:a16="http://schemas.microsoft.com/office/drawing/2014/main" id="{C428D70B-76CE-4D02-A2DD-5C5F1C280D75}"/>
+          <p:cNvPr id="79" name="Gerade Verbindung mit Pfeil 78">
+            <a:extLst>
+              <a:ext uri="{FF2B5EF4-FFF2-40B4-BE49-F238E27FC236}">
+                <a16:creationId xmlns:a16="http://schemas.microsoft.com/office/drawing/2014/main" id="{9DEEFD60-68A7-47E7-AEC9-3F59072F6A02}"/>
               </a:ext>
             </a:extLst>
           </p:cNvPr>
           <p:cNvCxnSpPr>
-            <a:stCxn id="62" idx="1"/>
-            <a:endCxn id="65" idx="3"/>
+            <a:cxnSpLocks/>
+            <a:stCxn id="65" idx="1"/>
+            <a:endCxn id="77" idx="3"/>
           </p:cNvCxnSpPr>
           <p:nvPr/>
         </p:nvCxnSpPr>
         <p:spPr>
-          <a:xfrm flipH="1">
-            <a:off x="2675388" y="3888706"/>
-            <a:ext cx="1003184" cy="0"/>
+          <a:xfrm flipH="1" flipV="1">
+            <a:off x="2675385" y="3887408"/>
+            <a:ext cx="814443" cy="1298"/>
           </a:xfrm>
           <a:prstGeom prst="straightConnector1">
             <a:avLst/>
@@ -4885,10 +5024,10 @@
       </p:cxnSp>
       <p:sp>
         <p:nvSpPr>
-          <p:cNvPr id="77" name="Rechteck: abgerundete Ecken 76">
-            <a:extLst>
-              <a:ext uri="{FF2B5EF4-FFF2-40B4-BE49-F238E27FC236}">
-                <a16:creationId xmlns:a16="http://schemas.microsoft.com/office/drawing/2014/main" id="{BF2AA316-5185-4045-BCA3-B94F50D96534}"/>
+          <p:cNvPr id="80" name="Rechteck: abgerundete Ecken 79">
+            <a:extLst>
+              <a:ext uri="{FF2B5EF4-FFF2-40B4-BE49-F238E27FC236}">
+                <a16:creationId xmlns:a16="http://schemas.microsoft.com/office/drawing/2014/main" id="{8575C091-8C65-4F2E-9498-F5FCDAD644AB}"/>
               </a:ext>
             </a:extLst>
           </p:cNvPr>
@@ -4897,7 +5036,7 @@
         </p:nvSpPr>
         <p:spPr>
           <a:xfrm>
-            <a:off x="838198" y="5214268"/>
+            <a:off x="838196" y="5233153"/>
             <a:ext cx="1837189" cy="872455"/>
           </a:xfrm>
           <a:prstGeom prst="roundRect">
@@ -4935,7 +5074,7 @@
                   </a:schemeClr>
                 </a:solidFill>
               </a:rPr>
-              <a:t>remove</a:t>
+              <a:t>group</a:t>
             </a:r>
             <a:r>
               <a:rPr lang="de-DE" dirty="0">
@@ -4946,7 +5085,7 @@
                   </a:schemeClr>
                 </a:solidFill>
               </a:rPr>
-              <a:t> own </a:t>
+              <a:t> </a:t>
             </a:r>
             <a:r>
               <a:rPr lang="de-DE" dirty="0" err="1">
@@ -4957,73 +5096,7 @@
                   </a:schemeClr>
                 </a:solidFill>
               </a:rPr>
-              <a:t>column</a:t>
-            </a:r>
-            <a:r>
-              <a:rPr lang="de-DE" dirty="0">
-                <a:solidFill>
-                  <a:schemeClr val="tx1">
-                    <a:lumMod val="95000"/>
-                    <a:lumOff val="5000"/>
-                  </a:schemeClr>
-                </a:solidFill>
-              </a:rPr>
-              <a:t> </a:t>
-            </a:r>
-            <a:r>
-              <a:rPr lang="de-DE" dirty="0" err="1">
-                <a:solidFill>
-                  <a:schemeClr val="tx1">
-                    <a:lumMod val="95000"/>
-                    <a:lumOff val="5000"/>
-                  </a:schemeClr>
-                </a:solidFill>
-              </a:rPr>
-              <a:t>from</a:t>
-            </a:r>
-            <a:r>
-              <a:rPr lang="de-DE" dirty="0">
-                <a:solidFill>
-                  <a:schemeClr val="tx1">
-                    <a:lumMod val="95000"/>
-                    <a:lumOff val="5000"/>
-                  </a:schemeClr>
-                </a:solidFill>
-              </a:rPr>
-              <a:t> </a:t>
-            </a:r>
-            <a:r>
-              <a:rPr lang="de-DE" dirty="0" err="1">
-                <a:solidFill>
-                  <a:schemeClr val="tx1">
-                    <a:lumMod val="95000"/>
-                    <a:lumOff val="5000"/>
-                  </a:schemeClr>
-                </a:solidFill>
-              </a:rPr>
-              <a:t>inclusion</a:t>
-            </a:r>
-            <a:r>
-              <a:rPr lang="de-DE" dirty="0">
-                <a:solidFill>
-                  <a:schemeClr val="tx1">
-                    <a:lumMod val="95000"/>
-                    <a:lumOff val="5000"/>
-                  </a:schemeClr>
-                </a:solidFill>
-              </a:rPr>
-              <a:t> </a:t>
-            </a:r>
-            <a:r>
-              <a:rPr lang="de-DE" dirty="0" err="1">
-                <a:solidFill>
-                  <a:schemeClr val="tx1">
-                    <a:lumMod val="95000"/>
-                    <a:lumOff val="5000"/>
-                  </a:schemeClr>
-                </a:solidFill>
-              </a:rPr>
-              <a:t>set</a:t>
+              <a:t>by</a:t>
             </a:r>
             <a:endParaRPr lang="de-DE" dirty="0">
               <a:solidFill>
@@ -5034,27 +5107,118 @@
               </a:solidFill>
             </a:endParaRPr>
           </a:p>
+          <a:p>
+            <a:pPr algn="ctr"/>
+            <a:r>
+              <a:rPr lang="de-DE" dirty="0" err="1">
+                <a:solidFill>
+                  <a:schemeClr val="tx1">
+                    <a:lumMod val="95000"/>
+                    <a:lumOff val="5000"/>
+                  </a:schemeClr>
+                </a:solidFill>
+              </a:rPr>
+              <a:t>column</a:t>
+            </a:r>
+            <a:r>
+              <a:rPr lang="de-DE" dirty="0">
+                <a:solidFill>
+                  <a:schemeClr val="tx1">
+                    <a:lumMod val="95000"/>
+                    <a:lumOff val="5000"/>
+                  </a:schemeClr>
+                </a:solidFill>
+              </a:rPr>
+              <a:t> </a:t>
+            </a:r>
+            <a:r>
+              <a:rPr lang="de-DE" dirty="0" err="1">
+                <a:solidFill>
+                  <a:schemeClr val="tx1">
+                    <a:lumMod val="95000"/>
+                    <a:lumOff val="5000"/>
+                  </a:schemeClr>
+                </a:solidFill>
+              </a:rPr>
+              <a:t>name</a:t>
+            </a:r>
+            <a:r>
+              <a:rPr lang="de-DE" dirty="0">
+                <a:solidFill>
+                  <a:schemeClr val="tx1">
+                    <a:lumMod val="95000"/>
+                    <a:lumOff val="5000"/>
+                  </a:schemeClr>
+                </a:solidFill>
+              </a:rPr>
+              <a:t> </a:t>
+            </a:r>
+            <a:r>
+              <a:rPr lang="de-DE" dirty="0" err="1">
+                <a:solidFill>
+                  <a:schemeClr val="tx1">
+                    <a:lumMod val="95000"/>
+                    <a:lumOff val="5000"/>
+                  </a:schemeClr>
+                </a:solidFill>
+              </a:rPr>
+              <a:t>agg</a:t>
+            </a:r>
+            <a:r>
+              <a:rPr lang="de-DE" dirty="0">
+                <a:solidFill>
+                  <a:schemeClr val="tx1">
+                    <a:lumMod val="95000"/>
+                    <a:lumOff val="5000"/>
+                  </a:schemeClr>
+                </a:solidFill>
+              </a:rPr>
+              <a:t>(</a:t>
+            </a:r>
+            <a:r>
+              <a:rPr lang="de-DE" dirty="0" err="1">
+                <a:solidFill>
+                  <a:schemeClr val="tx1">
+                    <a:lumMod val="95000"/>
+                    <a:lumOff val="5000"/>
+                  </a:schemeClr>
+                </a:solidFill>
+              </a:rPr>
+              <a:t>collect_set</a:t>
+            </a:r>
+            <a:r>
+              <a:rPr lang="de-DE" dirty="0">
+                <a:solidFill>
+                  <a:schemeClr val="tx1">
+                    <a:lumMod val="95000"/>
+                    <a:lumOff val="5000"/>
+                  </a:schemeClr>
+                </a:solidFill>
+              </a:rPr>
+              <a:t>)</a:t>
+            </a:r>
+          </a:p>
         </p:txBody>
       </p:sp>
       <p:cxnSp>
         <p:nvCxnSpPr>
-          <p:cNvPr id="79" name="Gerade Verbindung mit Pfeil 78">
-            <a:extLst>
-              <a:ext uri="{FF2B5EF4-FFF2-40B4-BE49-F238E27FC236}">
-                <a16:creationId xmlns:a16="http://schemas.microsoft.com/office/drawing/2014/main" id="{9DEEFD60-68A7-47E7-AEC9-3F59072F6A02}"/>
+          <p:cNvPr id="82" name="Gerade Verbindung mit Pfeil 81">
+            <a:extLst>
+              <a:ext uri="{FF2B5EF4-FFF2-40B4-BE49-F238E27FC236}">
+                <a16:creationId xmlns:a16="http://schemas.microsoft.com/office/drawing/2014/main" id="{1631CE90-758F-4F90-A845-8902E975397A}"/>
               </a:ext>
             </a:extLst>
           </p:cNvPr>
           <p:cNvCxnSpPr>
-            <a:stCxn id="65" idx="2"/>
-            <a:endCxn id="77" idx="0"/>
+            <a:cxnSpLocks/>
+            <a:stCxn id="77" idx="2"/>
           </p:cNvCxnSpPr>
           <p:nvPr/>
         </p:nvCxnSpPr>
         <p:spPr>
-          <a:xfrm flipH="1">
-            <a:off x="1756793" y="4324933"/>
-            <a:ext cx="1" cy="889335"/>
+          <a:xfrm>
+            <a:off x="1756791" y="4323635"/>
+            <a:ext cx="0" cy="921287"/>
           </a:xfrm>
           <a:prstGeom prst="straightConnector1">
             <a:avLst/>
@@ -5080,10 +5244,10 @@
       </p:cxnSp>
       <p:sp>
         <p:nvSpPr>
-          <p:cNvPr id="80" name="Rechteck: abgerundete Ecken 79">
-            <a:extLst>
-              <a:ext uri="{FF2B5EF4-FFF2-40B4-BE49-F238E27FC236}">
-                <a16:creationId xmlns:a16="http://schemas.microsoft.com/office/drawing/2014/main" id="{8575C091-8C65-4F2E-9498-F5FCDAD644AB}"/>
+          <p:cNvPr id="83" name="Rechteck: abgerundete Ecken 82">
+            <a:extLst>
+              <a:ext uri="{FF2B5EF4-FFF2-40B4-BE49-F238E27FC236}">
+                <a16:creationId xmlns:a16="http://schemas.microsoft.com/office/drawing/2014/main" id="{AAF67A1B-1E57-4271-8B72-6B8BB70B9FD3}"/>
               </a:ext>
             </a:extLst>
           </p:cNvPr>
@@ -5092,7 +5256,7 @@
         </p:nvSpPr>
         <p:spPr>
           <a:xfrm>
-            <a:off x="3678571" y="5214268"/>
+            <a:off x="3678569" y="5214267"/>
             <a:ext cx="1837189" cy="872455"/>
           </a:xfrm>
           <a:prstGeom prst="roundRect">
@@ -5130,7 +5294,7 @@
                   </a:schemeClr>
                 </a:solidFill>
               </a:rPr>
-              <a:t>group</a:t>
+              <a:t>intersect</a:t>
             </a:r>
             <a:r>
               <a:rPr lang="de-DE" dirty="0">
@@ -5152,7 +5316,73 @@
                   </a:schemeClr>
                 </a:solidFill>
               </a:rPr>
-              <a:t>by</a:t>
+              <a:t>set</a:t>
+            </a:r>
+            <a:r>
+              <a:rPr lang="de-DE" dirty="0">
+                <a:solidFill>
+                  <a:schemeClr val="tx1">
+                    <a:lumMod val="95000"/>
+                    <a:lumOff val="5000"/>
+                  </a:schemeClr>
+                </a:solidFill>
+              </a:rPr>
+              <a:t> </a:t>
+            </a:r>
+            <a:r>
+              <a:rPr lang="de-DE" dirty="0" err="1">
+                <a:solidFill>
+                  <a:schemeClr val="tx1">
+                    <a:lumMod val="95000"/>
+                    <a:lumOff val="5000"/>
+                  </a:schemeClr>
+                </a:solidFill>
+              </a:rPr>
+              <a:t>of</a:t>
+            </a:r>
+            <a:r>
+              <a:rPr lang="de-DE" dirty="0">
+                <a:solidFill>
+                  <a:schemeClr val="tx1">
+                    <a:lumMod val="95000"/>
+                    <a:lumOff val="5000"/>
+                  </a:schemeClr>
+                </a:solidFill>
+              </a:rPr>
+              <a:t> </a:t>
+            </a:r>
+            <a:r>
+              <a:rPr lang="de-DE" dirty="0" err="1">
+                <a:solidFill>
+                  <a:schemeClr val="tx1">
+                    <a:lumMod val="95000"/>
+                    <a:lumOff val="5000"/>
+                  </a:schemeClr>
+                </a:solidFill>
+              </a:rPr>
+              <a:t>inclusion</a:t>
+            </a:r>
+            <a:r>
+              <a:rPr lang="de-DE" dirty="0">
+                <a:solidFill>
+                  <a:schemeClr val="tx1">
+                    <a:lumMod val="95000"/>
+                    <a:lumOff val="5000"/>
+                  </a:schemeClr>
+                </a:solidFill>
+              </a:rPr>
+              <a:t> </a:t>
+            </a:r>
+            <a:r>
+              <a:rPr lang="de-DE" dirty="0" err="1">
+                <a:solidFill>
+                  <a:schemeClr val="tx1">
+                    <a:lumMod val="95000"/>
+                    <a:lumOff val="5000"/>
+                  </a:schemeClr>
+                </a:solidFill>
+              </a:rPr>
+              <a:t>sets</a:t>
             </a:r>
             <a:endParaRPr lang="de-DE" dirty="0">
               <a:solidFill>
@@ -5163,118 +5393,27 @@
               </a:solidFill>
             </a:endParaRPr>
           </a:p>
-          <a:p>
-            <a:pPr algn="ctr"/>
-            <a:r>
-              <a:rPr lang="de-DE" dirty="0" err="1">
-                <a:solidFill>
-                  <a:schemeClr val="tx1">
-                    <a:lumMod val="95000"/>
-                    <a:lumOff val="5000"/>
-                  </a:schemeClr>
-                </a:solidFill>
-              </a:rPr>
-              <a:t>column</a:t>
-            </a:r>
-            <a:r>
-              <a:rPr lang="de-DE" dirty="0">
-                <a:solidFill>
-                  <a:schemeClr val="tx1">
-                    <a:lumMod val="95000"/>
-                    <a:lumOff val="5000"/>
-                  </a:schemeClr>
-                </a:solidFill>
-              </a:rPr>
-              <a:t> </a:t>
-            </a:r>
-            <a:r>
-              <a:rPr lang="de-DE" dirty="0" err="1">
-                <a:solidFill>
-                  <a:schemeClr val="tx1">
-                    <a:lumMod val="95000"/>
-                    <a:lumOff val="5000"/>
-                  </a:schemeClr>
-                </a:solidFill>
-              </a:rPr>
-              <a:t>name</a:t>
-            </a:r>
-            <a:r>
-              <a:rPr lang="de-DE" dirty="0">
-                <a:solidFill>
-                  <a:schemeClr val="tx1">
-                    <a:lumMod val="95000"/>
-                    <a:lumOff val="5000"/>
-                  </a:schemeClr>
-                </a:solidFill>
-              </a:rPr>
-              <a:t> </a:t>
-            </a:r>
-            <a:r>
-              <a:rPr lang="de-DE" dirty="0" err="1">
-                <a:solidFill>
-                  <a:schemeClr val="tx1">
-                    <a:lumMod val="95000"/>
-                    <a:lumOff val="5000"/>
-                  </a:schemeClr>
-                </a:solidFill>
-              </a:rPr>
-              <a:t>agg</a:t>
-            </a:r>
-            <a:r>
-              <a:rPr lang="de-DE" dirty="0">
-                <a:solidFill>
-                  <a:schemeClr val="tx1">
-                    <a:lumMod val="95000"/>
-                    <a:lumOff val="5000"/>
-                  </a:schemeClr>
-                </a:solidFill>
-              </a:rPr>
-              <a:t>(</a:t>
-            </a:r>
-            <a:r>
-              <a:rPr lang="de-DE" dirty="0" err="1">
-                <a:solidFill>
-                  <a:schemeClr val="tx1">
-                    <a:lumMod val="95000"/>
-                    <a:lumOff val="5000"/>
-                  </a:schemeClr>
-                </a:solidFill>
-              </a:rPr>
-              <a:t>collect_set</a:t>
-            </a:r>
-            <a:r>
-              <a:rPr lang="de-DE" dirty="0">
-                <a:solidFill>
-                  <a:schemeClr val="tx1">
-                    <a:lumMod val="95000"/>
-                    <a:lumOff val="5000"/>
-                  </a:schemeClr>
-                </a:solidFill>
-              </a:rPr>
-              <a:t>)</a:t>
-            </a:r>
-          </a:p>
         </p:txBody>
       </p:sp>
       <p:cxnSp>
         <p:nvCxnSpPr>
-          <p:cNvPr id="82" name="Gerade Verbindung mit Pfeil 81">
-            <a:extLst>
-              <a:ext uri="{FF2B5EF4-FFF2-40B4-BE49-F238E27FC236}">
-                <a16:creationId xmlns:a16="http://schemas.microsoft.com/office/drawing/2014/main" id="{1631CE90-758F-4F90-A845-8902E975397A}"/>
+          <p:cNvPr id="86" name="Gerade Verbindung mit Pfeil 85">
+            <a:extLst>
+              <a:ext uri="{FF2B5EF4-FFF2-40B4-BE49-F238E27FC236}">
+                <a16:creationId xmlns:a16="http://schemas.microsoft.com/office/drawing/2014/main" id="{51BA017B-DC94-4F8E-9FDC-9E2CCF90E167}"/>
               </a:ext>
             </a:extLst>
           </p:cNvPr>
           <p:cNvCxnSpPr>
-            <a:stCxn id="77" idx="3"/>
-            <a:endCxn id="80" idx="1"/>
+            <a:stCxn id="80" idx="3"/>
+            <a:endCxn id="83" idx="1"/>
           </p:cNvCxnSpPr>
           <p:nvPr/>
         </p:nvCxnSpPr>
         <p:spPr>
-          <a:xfrm>
-            <a:off x="2675387" y="5650496"/>
-            <a:ext cx="1003184" cy="0"/>
+          <a:xfrm flipV="1">
+            <a:off x="2675385" y="5650495"/>
+            <a:ext cx="1003184" cy="18886"/>
           </a:xfrm>
           <a:prstGeom prst="straightConnector1">
             <a:avLst/>
@@ -5300,10 +5439,10 @@
       </p:cxnSp>
       <p:sp>
         <p:nvSpPr>
-          <p:cNvPr id="83" name="Rechteck: abgerundete Ecken 82">
-            <a:extLst>
-              <a:ext uri="{FF2B5EF4-FFF2-40B4-BE49-F238E27FC236}">
-                <a16:creationId xmlns:a16="http://schemas.microsoft.com/office/drawing/2014/main" id="{AAF67A1B-1E57-4271-8B72-6B8BB70B9FD3}"/>
+          <p:cNvPr id="87" name="Rechteck: abgerundete Ecken 86">
+            <a:extLst>
+              <a:ext uri="{FF2B5EF4-FFF2-40B4-BE49-F238E27FC236}">
+                <a16:creationId xmlns:a16="http://schemas.microsoft.com/office/drawing/2014/main" id="{AE613B0E-CCFC-4A20-87C7-43CEFEE7A01C}"/>
               </a:ext>
             </a:extLst>
           </p:cNvPr>
@@ -5312,7 +5451,7 @@
         </p:nvSpPr>
         <p:spPr>
           <a:xfrm>
-            <a:off x="6518944" y="5214268"/>
+            <a:off x="6518938" y="5214266"/>
             <a:ext cx="1837189" cy="872455"/>
           </a:xfrm>
           <a:prstGeom prst="roundRect">
@@ -5350,7 +5489,7 @@
                   </a:schemeClr>
                 </a:solidFill>
               </a:rPr>
-              <a:t>intersect</a:t>
+              <a:t>filter</a:t>
             </a:r>
             <a:r>
               <a:rPr lang="de-DE" dirty="0">
@@ -5361,7 +5500,7 @@
                   </a:schemeClr>
                 </a:solidFill>
               </a:rPr>
-              <a:t> </a:t>
+              <a:t> non </a:t>
             </a:r>
             <a:r>
               <a:rPr lang="de-DE" dirty="0" err="1">
@@ -5372,51 +5511,7 @@
                   </a:schemeClr>
                 </a:solidFill>
               </a:rPr>
-              <a:t>set</a:t>
-            </a:r>
-            <a:r>
-              <a:rPr lang="de-DE" dirty="0">
-                <a:solidFill>
-                  <a:schemeClr val="tx1">
-                    <a:lumMod val="95000"/>
-                    <a:lumOff val="5000"/>
-                  </a:schemeClr>
-                </a:solidFill>
-              </a:rPr>
-              <a:t> </a:t>
-            </a:r>
-            <a:r>
-              <a:rPr lang="de-DE" dirty="0" err="1">
-                <a:solidFill>
-                  <a:schemeClr val="tx1">
-                    <a:lumMod val="95000"/>
-                    <a:lumOff val="5000"/>
-                  </a:schemeClr>
-                </a:solidFill>
-              </a:rPr>
-              <a:t>of</a:t>
-            </a:r>
-            <a:r>
-              <a:rPr lang="de-DE" dirty="0">
-                <a:solidFill>
-                  <a:schemeClr val="tx1">
-                    <a:lumMod val="95000"/>
-                    <a:lumOff val="5000"/>
-                  </a:schemeClr>
-                </a:solidFill>
-              </a:rPr>
-              <a:t> </a:t>
-            </a:r>
-            <a:r>
-              <a:rPr lang="de-DE" dirty="0" err="1">
-                <a:solidFill>
-                  <a:schemeClr val="tx1">
-                    <a:lumMod val="95000"/>
-                    <a:lumOff val="5000"/>
-                  </a:schemeClr>
-                </a:solidFill>
-              </a:rPr>
-              <a:t>inclusion</a:t>
+              <a:t>empty</a:t>
             </a:r>
             <a:r>
               <a:rPr lang="de-DE" dirty="0">
@@ -5453,23 +5548,23 @@
       </p:sp>
       <p:cxnSp>
         <p:nvCxnSpPr>
-          <p:cNvPr id="86" name="Gerade Verbindung mit Pfeil 85">
-            <a:extLst>
-              <a:ext uri="{FF2B5EF4-FFF2-40B4-BE49-F238E27FC236}">
-                <a16:creationId xmlns:a16="http://schemas.microsoft.com/office/drawing/2014/main" id="{51BA017B-DC94-4F8E-9FDC-9E2CCF90E167}"/>
+          <p:cNvPr id="89" name="Gerade Verbindung mit Pfeil 88">
+            <a:extLst>
+              <a:ext uri="{FF2B5EF4-FFF2-40B4-BE49-F238E27FC236}">
+                <a16:creationId xmlns:a16="http://schemas.microsoft.com/office/drawing/2014/main" id="{9C8B63EF-F0AC-4059-A7F7-59CE41D4DAA6}"/>
               </a:ext>
             </a:extLst>
           </p:cNvPr>
           <p:cNvCxnSpPr>
-            <a:stCxn id="80" idx="3"/>
-            <a:endCxn id="83" idx="1"/>
+            <a:stCxn id="83" idx="3"/>
+            <a:endCxn id="87" idx="1"/>
           </p:cNvCxnSpPr>
           <p:nvPr/>
         </p:nvCxnSpPr>
         <p:spPr>
-          <a:xfrm>
-            <a:off x="5515760" y="5650496"/>
-            <a:ext cx="1003184" cy="0"/>
+          <a:xfrm flipV="1">
+            <a:off x="5515758" y="5650494"/>
+            <a:ext cx="1003180" cy="1"/>
           </a:xfrm>
           <a:prstGeom prst="straightConnector1">
             <a:avLst/>
@@ -5495,10 +5590,10 @@
       </p:cxnSp>
       <p:sp>
         <p:nvSpPr>
-          <p:cNvPr id="87" name="Rechteck: abgerundete Ecken 86">
-            <a:extLst>
-              <a:ext uri="{FF2B5EF4-FFF2-40B4-BE49-F238E27FC236}">
-                <a16:creationId xmlns:a16="http://schemas.microsoft.com/office/drawing/2014/main" id="{AE613B0E-CCFC-4A20-87C7-43CEFEE7A01C}"/>
+          <p:cNvPr id="50" name="Rechteck: abgerundete Ecken 49">
+            <a:extLst>
+              <a:ext uri="{FF2B5EF4-FFF2-40B4-BE49-F238E27FC236}">
+                <a16:creationId xmlns:a16="http://schemas.microsoft.com/office/drawing/2014/main" id="{07A24448-1C27-40E5-8C80-0F08515D5400}"/>
               </a:ext>
             </a:extLst>
           </p:cNvPr>
@@ -5507,7 +5602,7 @@
         </p:nvSpPr>
         <p:spPr>
           <a:xfrm>
-            <a:off x="9359317" y="5214268"/>
+            <a:off x="9359307" y="5223710"/>
             <a:ext cx="1837189" cy="872455"/>
           </a:xfrm>
           <a:prstGeom prst="roundRect">
@@ -5545,7 +5640,7 @@
                   </a:schemeClr>
                 </a:solidFill>
               </a:rPr>
-              <a:t>filter</a:t>
+              <a:t>print</a:t>
             </a:r>
             <a:r>
               <a:rPr lang="de-DE" dirty="0">
@@ -5556,7 +5651,7 @@
                   </a:schemeClr>
                 </a:solidFill>
               </a:rPr>
-              <a:t> non </a:t>
+              <a:t> </a:t>
             </a:r>
             <a:r>
               <a:rPr lang="de-DE" dirty="0" err="1">
@@ -5567,7 +5662,7 @@
                   </a:schemeClr>
                 </a:solidFill>
               </a:rPr>
-              <a:t>empty</a:t>
+              <a:t>inclusion</a:t>
             </a:r>
             <a:r>
               <a:rPr lang="de-DE" dirty="0">
@@ -5589,7 +5684,7 @@
                   </a:schemeClr>
                 </a:solidFill>
               </a:rPr>
-              <a:t>sets</a:t>
+              <a:t>dependencies</a:t>
             </a:r>
             <a:endParaRPr lang="de-DE" dirty="0">
               <a:solidFill>
@@ -5604,23 +5699,20 @@
       </p:sp>
       <p:cxnSp>
         <p:nvCxnSpPr>
-          <p:cNvPr id="89" name="Gerade Verbindung mit Pfeil 88">
-            <a:extLst>
-              <a:ext uri="{FF2B5EF4-FFF2-40B4-BE49-F238E27FC236}">
-                <a16:creationId xmlns:a16="http://schemas.microsoft.com/office/drawing/2014/main" id="{9C8B63EF-F0AC-4059-A7F7-59CE41D4DAA6}"/>
-              </a:ext>
-            </a:extLst>
-          </p:cNvPr>
-          <p:cNvCxnSpPr>
-            <a:stCxn id="83" idx="3"/>
-            <a:endCxn id="87" idx="1"/>
-          </p:cNvCxnSpPr>
+          <p:cNvPr id="51" name="Gerade Verbindung mit Pfeil 50">
+            <a:extLst>
+              <a:ext uri="{FF2B5EF4-FFF2-40B4-BE49-F238E27FC236}">
+                <a16:creationId xmlns:a16="http://schemas.microsoft.com/office/drawing/2014/main" id="{CF25BCFF-4E17-4FDA-975B-334CA7A20BF2}"/>
+              </a:ext>
+            </a:extLst>
+          </p:cNvPr>
+          <p:cNvCxnSpPr/>
           <p:nvPr/>
         </p:nvCxnSpPr>
         <p:spPr>
-          <a:xfrm>
-            <a:off x="8356133" y="5650496"/>
-            <a:ext cx="1003184" cy="0"/>
+          <a:xfrm flipV="1">
+            <a:off x="8356127" y="5649195"/>
+            <a:ext cx="1003180" cy="1"/>
           </a:xfrm>
           <a:prstGeom prst="straightConnector1">
             <a:avLst/>

</xml_diff>